<commit_message>
http://rawgit.com/ the link to create the url
</commit_message>
<xml_diff>
--- a/PresentationFinalProjectSnakeAkaPython.pptx
+++ b/PresentationFinalProjectSnakeAkaPython.pptx
@@ -113,6 +113,22 @@
       </a:defRPr>
     </a:lvl9pPr>
   </p:defaultTextStyle>
+  <p:extLst>
+    <p:ext uri="{EFAFB233-063F-42B5-8137-9DF3F51BA10A}">
+      <p15:sldGuideLst xmlns:p15="http://schemas.microsoft.com/office/powerpoint/2012/main">
+        <p15:guide id="1" orient="horz" pos="2160">
+          <p15:clr>
+            <a:srgbClr val="A4A3A4"/>
+          </p15:clr>
+        </p15:guide>
+        <p15:guide id="2" pos="2880">
+          <p15:clr>
+            <a:srgbClr val="A4A3A4"/>
+          </p15:clr>
+        </p15:guide>
+      </p15:sldGuideLst>
+    </p:ext>
+  </p:extLst>
 </p:presentation>
 </file>
 
@@ -4042,15 +4058,7 @@
           <a:p>
             <a:r>
               <a:rPr lang="en-GB" sz="2400" dirty="0" smtClean="0"/>
-              <a:t>Pr</a:t>
-            </a:r>
-            <a:r>
-              <a:rPr lang="en-GB" sz="2400" dirty="0" smtClean="0"/>
-              <a:t>e-processing </a:t>
-            </a:r>
-            <a:r>
-              <a:rPr lang="en-GB" sz="2400" dirty="0" smtClean="0"/>
-              <a:t>of the data </a:t>
+              <a:t>Pre-processing of the data </a:t>
             </a:r>
             <a:r>
               <a:rPr lang="en-GB" sz="1800" dirty="0" smtClean="0"/>
@@ -4126,19 +4134,20 @@
               <a:t>Final markdown report </a:t>
             </a:r>
             <a:r>
-              <a:rPr lang="en-GB" sz="1600" dirty="0" smtClean="0"/>
+              <a:rPr lang="en-GB" sz="1600" dirty="0"/>
               <a:t>(</a:t>
             </a:r>
             <a:r>
-              <a:rPr lang="en-GB" sz="1600" dirty="0" smtClean="0">
+              <a:rPr lang="en-GB" sz="1600" dirty="0">
                 <a:hlinkClick r:id="rId4"/>
               </a:rPr>
-              <a:t>https://github.com/SnakeAkaPython/FinalReportGeo-ScriptingGRS-51806/blob/master/FinalProjectReport.Rmd</a:t>
-            </a:r>
-            <a:r>
-              <a:rPr lang="en-GB" sz="1600" dirty="0" smtClean="0"/>
+              <a:t>https://cdn.rawgit.com/SnakeAkaPython/FinalReportGeo-ScriptingGRS-51806/master/FinalProjectReporttest.html</a:t>
+            </a:r>
+            <a:r>
+              <a:rPr lang="en-GB" sz="1600" dirty="0"/>
               <a:t>)</a:t>
             </a:r>
+            <a:endParaRPr lang="en-GB" sz="1600" dirty="0" smtClean="0"/>
           </a:p>
         </p:txBody>
       </p:sp>

</xml_diff>